<commit_message>
Add challenges and needs
</commit_message>
<xml_diff>
--- a/DaveTeachingITTrainers-2.pptx
+++ b/DaveTeachingITTrainers-2.pptx
@@ -7,21 +7,23 @@
   <p:sldIdLst>
     <p:sldId id="256" r:id="rId2"/>
     <p:sldId id="271" r:id="rId3"/>
-    <p:sldId id="257" r:id="rId4"/>
-    <p:sldId id="262" r:id="rId5"/>
-    <p:sldId id="259" r:id="rId6"/>
-    <p:sldId id="258" r:id="rId7"/>
-    <p:sldId id="260" r:id="rId8"/>
-    <p:sldId id="261" r:id="rId9"/>
-    <p:sldId id="267" r:id="rId10"/>
-    <p:sldId id="265" r:id="rId11"/>
-    <p:sldId id="266" r:id="rId12"/>
-    <p:sldId id="263" r:id="rId13"/>
-    <p:sldId id="264" r:id="rId14"/>
-    <p:sldId id="268" r:id="rId15"/>
-    <p:sldId id="269" r:id="rId16"/>
-    <p:sldId id="272" r:id="rId17"/>
-    <p:sldId id="270" r:id="rId18"/>
+    <p:sldId id="273" r:id="rId4"/>
+    <p:sldId id="274" r:id="rId5"/>
+    <p:sldId id="257" r:id="rId6"/>
+    <p:sldId id="262" r:id="rId7"/>
+    <p:sldId id="259" r:id="rId8"/>
+    <p:sldId id="258" r:id="rId9"/>
+    <p:sldId id="260" r:id="rId10"/>
+    <p:sldId id="261" r:id="rId11"/>
+    <p:sldId id="267" r:id="rId12"/>
+    <p:sldId id="265" r:id="rId13"/>
+    <p:sldId id="266" r:id="rId14"/>
+    <p:sldId id="263" r:id="rId15"/>
+    <p:sldId id="264" r:id="rId16"/>
+    <p:sldId id="268" r:id="rId17"/>
+    <p:sldId id="269" r:id="rId18"/>
+    <p:sldId id="272" r:id="rId19"/>
+    <p:sldId id="270" r:id="rId20"/>
   </p:sldIdLst>
   <p:sldSz cx="9144000" cy="6858000" type="screen4x3"/>
   <p:notesSz cx="6858000" cy="9144000"/>
@@ -3898,7 +3900,7 @@
           <a:p>
             <a:r>
               <a:rPr lang="en-US" dirty="0" smtClean="0"/>
-              <a:t>Sample of a Quick Quiz</a:t>
+              <a:t>Quizzing</a:t>
             </a:r>
             <a:endParaRPr lang="en-US" dirty="0"/>
           </a:p>
@@ -3911,44 +3913,99 @@
             <a:spLocks noGrp="1"/>
           </p:cNvSpPr>
           <p:nvPr>
-            <p:ph idx="1"/>
-          </p:nvPr>
-        </p:nvSpPr>
-        <p:spPr/>
-        <p:txBody>
-          <a:bodyPr/>
-          <a:lstStyle/>
-          <a:p>
-            <a:r>
-              <a:rPr lang="en-US" dirty="0" smtClean="0"/>
-              <a:t>Q:  </a:t>
-            </a:r>
-            <a:r>
-              <a:rPr lang="en-US" dirty="0" smtClean="0"/>
-              <a:t>What ar</a:t>
-            </a:r>
-            <a:r>
-              <a:rPr lang="en-US" dirty="0" smtClean="0"/>
-              <a:t>e the three main components of the deployment model?</a:t>
-            </a:r>
-          </a:p>
-          <a:p>
-            <a:r>
-              <a:rPr lang="en-US" dirty="0"/>
-              <a:t>A: Deployable + Container = </a:t>
-            </a:r>
-            <a:r>
-              <a:rPr lang="en-US" dirty="0" smtClean="0"/>
-              <a:t>Deployed</a:t>
-            </a:r>
-            <a:endParaRPr lang="en-US" dirty="0"/>
-          </a:p>
-        </p:txBody>
-      </p:sp>
+            <p:ph sz="half" idx="1"/>
+          </p:nvPr>
+        </p:nvSpPr>
+        <p:spPr/>
+        <p:txBody>
+          <a:bodyPr>
+            <a:normAutofit fontScale="55000" lnSpcReduction="20000"/>
+          </a:bodyPr>
+          <a:lstStyle/>
+          <a:p>
+            <a:r>
+              <a:rPr lang="en-US" dirty="0" smtClean="0"/>
+              <a:t>You may or may not want to do this, but it is an effective way to learn and retain, especially if there are a few people at your training.</a:t>
+            </a:r>
+          </a:p>
+          <a:p>
+            <a:r>
+              <a:rPr lang="en-US" dirty="0" smtClean="0">
+                <a:solidFill>
+                  <a:srgbClr val="FFFF00"/>
+                </a:solidFill>
+              </a:rPr>
+              <a:t>Studies have shown that quizzing is a good retention/application technique</a:t>
+            </a:r>
+            <a:r>
+              <a:rPr lang="en-US" dirty="0" smtClean="0"/>
+              <a:t>.</a:t>
+            </a:r>
+          </a:p>
+          <a:p>
+            <a:r>
+              <a:rPr lang="en-US" dirty="0" smtClean="0"/>
+              <a:t>After each section (or every two sections), have a quiz or some kind of sample problem around the technology covered.  Make it a contest!</a:t>
+            </a:r>
+          </a:p>
+          <a:p>
+            <a:r>
+              <a:rPr lang="en-US" dirty="0" smtClean="0"/>
+              <a:t>Everyone loves swag, candy, any kind of motivator.</a:t>
+            </a:r>
+          </a:p>
+          <a:p>
+            <a:r>
+              <a:rPr lang="en-US" dirty="0" smtClean="0"/>
+              <a:t>This will break up the day.</a:t>
+            </a:r>
+          </a:p>
+          <a:p>
+            <a:r>
+              <a:rPr lang="en-US" dirty="0" smtClean="0"/>
+              <a:t>This also makes it seem like a class, which formalizes the training. </a:t>
+            </a:r>
+          </a:p>
+          <a:p>
+            <a:r>
+              <a:rPr lang="en-US" dirty="0" smtClean="0">
+                <a:solidFill>
+                  <a:srgbClr val="FFFF00"/>
+                </a:solidFill>
+              </a:rPr>
+              <a:t>Most importantly, it helps with identifying training gaps! </a:t>
+            </a:r>
+            <a:endParaRPr lang="en-US" dirty="0">
+              <a:solidFill>
+                <a:srgbClr val="FFFF00"/>
+              </a:solidFill>
+            </a:endParaRPr>
+          </a:p>
+        </p:txBody>
+      </p:sp>
+      <p:pic>
+        <p:nvPicPr>
+          <p:cNvPr id="5" name="Content Placeholder 4"/>
+          <p:cNvPicPr>
+            <a:picLocks noGrp="1" noChangeAspect="1"/>
+          </p:cNvPicPr>
+          <p:nvPr>
+            <p:ph sz="half" idx="2"/>
+          </p:nvPr>
+        </p:nvPicPr>
+        <p:blipFill>
+          <a:blip r:embed="rId2"/>
+          <a:srcRect l="1814" r="1814"/>
+          <a:stretch>
+            <a:fillRect/>
+          </a:stretch>
+        </p:blipFill>
+        <p:spPr/>
+      </p:pic>
     </p:spTree>
     <p:extLst>
       <p:ext uri="{BB962C8B-B14F-4D97-AF65-F5344CB8AC3E}">
-        <p14:creationId xmlns:p14="http://schemas.microsoft.com/office/powerpoint/2010/main" val="3917508685"/>
+        <p14:creationId xmlns:p14="http://schemas.microsoft.com/office/powerpoint/2010/main" val="1802896055"/>
       </p:ext>
     </p:extLst>
   </p:cSld>
@@ -3999,7 +4056,7 @@
           <a:p>
             <a:r>
               <a:rPr lang="en-US" dirty="0" smtClean="0"/>
-              <a:t>Sample of a Problem to Solve</a:t>
+              <a:t>Quizzes and Sample Problems</a:t>
             </a:r>
             <a:endParaRPr lang="en-US" dirty="0"/>
           </a:p>
@@ -4022,13 +4079,26 @@
           <a:p>
             <a:r>
               <a:rPr lang="en-US" dirty="0" smtClean="0"/>
-              <a:t>As an application administrator, I want to stop users from deploying a version earlier than the current one.</a:t>
-            </a:r>
-          </a:p>
-          <a:p>
-            <a:r>
-              <a:rPr lang="en-US" dirty="0" smtClean="0"/>
-              <a:t>Solution:  Easy to accomplish with a couple of type-modifications and a three-line planning script!</a:t>
+              <a:t>Make sure you have a few quizzes and sample problems ready to go</a:t>
+            </a:r>
+          </a:p>
+          <a:p>
+            <a:r>
+              <a:rPr lang="en-US" dirty="0" smtClean="0"/>
+              <a:t>Companies are buying your technology to help them solve their problems.  </a:t>
+            </a:r>
+            <a:endParaRPr lang="en-US" dirty="0"/>
+          </a:p>
+          <a:p>
+            <a:r>
+              <a:rPr lang="en-US" dirty="0" smtClean="0"/>
+              <a:t>Mock up some common issues and have trainees solve it with the technology.</a:t>
+            </a:r>
+          </a:p>
+          <a:p>
+            <a:r>
+              <a:rPr lang="en-US" dirty="0" smtClean="0"/>
+              <a:t>This will help ingrain the application and help them see the utilization</a:t>
             </a:r>
             <a:endParaRPr lang="en-US" dirty="0"/>
           </a:p>
@@ -4037,7 +4107,7 @@
     </p:spTree>
     <p:extLst>
       <p:ext uri="{BB962C8B-B14F-4D97-AF65-F5344CB8AC3E}">
-        <p14:creationId xmlns:p14="http://schemas.microsoft.com/office/powerpoint/2010/main" val="2843832134"/>
+        <p14:creationId xmlns:p14="http://schemas.microsoft.com/office/powerpoint/2010/main" val="3428838318"/>
       </p:ext>
     </p:extLst>
   </p:cSld>
@@ -4088,7 +4158,7 @@
           <a:p>
             <a:r>
               <a:rPr lang="en-US" dirty="0" smtClean="0"/>
-              <a:t>End of the Day’s Training</a:t>
+              <a:t>Sample of a Quick Quiz</a:t>
             </a:r>
             <a:endParaRPr lang="en-US" dirty="0"/>
           </a:p>
@@ -4106,50 +4176,30 @@
         </p:nvSpPr>
         <p:spPr/>
         <p:txBody>
-          <a:bodyPr>
-            <a:normAutofit fontScale="92500" lnSpcReduction="10000"/>
-          </a:bodyPr>
-          <a:lstStyle/>
-          <a:p>
-            <a:r>
-              <a:rPr lang="en-US" dirty="0" smtClean="0"/>
-              <a:t>Recap the technology/concepts.</a:t>
-            </a:r>
-          </a:p>
-          <a:p>
-            <a:r>
-              <a:rPr lang="en-US" dirty="0" smtClean="0"/>
-              <a:t>You can use a quiz or a sample problem here.</a:t>
-            </a:r>
-          </a:p>
-          <a:p>
-            <a:r>
-              <a:rPr lang="en-US" dirty="0" smtClean="0"/>
-              <a:t>Again, swag counts!</a:t>
-            </a:r>
-          </a:p>
-          <a:p>
-            <a:r>
-              <a:rPr lang="en-US" dirty="0" smtClean="0"/>
-              <a:t>Take questions and suggestions.</a:t>
-            </a:r>
-          </a:p>
-          <a:p>
-            <a:r>
-              <a:rPr lang="en-US" dirty="0" smtClean="0"/>
-              <a:t>Look at your overall concept map.  Does it need changes?</a:t>
-            </a:r>
-          </a:p>
-          <a:p>
-            <a:r>
-              <a:rPr lang="en-US" dirty="0" smtClean="0"/>
-              <a:t>Remember, you don’t want to make drastic changes.  </a:t>
-            </a:r>
-          </a:p>
-          <a:p>
-            <a:r>
-              <a:rPr lang="en-US" dirty="0" smtClean="0"/>
-              <a:t>Try and stick as close to the plan as you can.</a:t>
+          <a:bodyPr/>
+          <a:lstStyle/>
+          <a:p>
+            <a:r>
+              <a:rPr lang="en-US" dirty="0" smtClean="0"/>
+              <a:t>Q:  </a:t>
+            </a:r>
+            <a:r>
+              <a:rPr lang="en-US" dirty="0" smtClean="0"/>
+              <a:t>What ar</a:t>
+            </a:r>
+            <a:r>
+              <a:rPr lang="en-US" dirty="0" smtClean="0"/>
+              <a:t>e the three main components of the deployment model?</a:t>
+            </a:r>
+          </a:p>
+          <a:p>
+            <a:r>
+              <a:rPr lang="en-US" dirty="0"/>
+              <a:t>A: Deployable + Container = </a:t>
+            </a:r>
+            <a:r>
+              <a:rPr lang="en-US" dirty="0" smtClean="0"/>
+              <a:t>Deployed</a:t>
             </a:r>
             <a:endParaRPr lang="en-US" dirty="0"/>
           </a:p>
@@ -4158,7 +4208,7 @@
     </p:spTree>
     <p:extLst>
       <p:ext uri="{BB962C8B-B14F-4D97-AF65-F5344CB8AC3E}">
-        <p14:creationId xmlns:p14="http://schemas.microsoft.com/office/powerpoint/2010/main" val="3186237308"/>
+        <p14:creationId xmlns:p14="http://schemas.microsoft.com/office/powerpoint/2010/main" val="3917508685"/>
       </p:ext>
     </p:extLst>
   </p:cSld>
@@ -4209,6 +4259,216 @@
           <a:p>
             <a:r>
               <a:rPr lang="en-US" dirty="0" smtClean="0"/>
+              <a:t>Sample of a Problem to Solve</a:t>
+            </a:r>
+            <a:endParaRPr lang="en-US" dirty="0"/>
+          </a:p>
+        </p:txBody>
+      </p:sp>
+      <p:sp>
+        <p:nvSpPr>
+          <p:cNvPr id="3" name="Content Placeholder 2"/>
+          <p:cNvSpPr>
+            <a:spLocks noGrp="1"/>
+          </p:cNvSpPr>
+          <p:nvPr>
+            <p:ph idx="1"/>
+          </p:nvPr>
+        </p:nvSpPr>
+        <p:spPr/>
+        <p:txBody>
+          <a:bodyPr/>
+          <a:lstStyle/>
+          <a:p>
+            <a:r>
+              <a:rPr lang="en-US" dirty="0" smtClean="0"/>
+              <a:t>As an application administrator, I want to stop users from deploying a version earlier than the current one.</a:t>
+            </a:r>
+          </a:p>
+          <a:p>
+            <a:r>
+              <a:rPr lang="en-US" dirty="0" smtClean="0"/>
+              <a:t>Solution:  Easy to accomplish with a couple of type-modifications and a three-line planning script!</a:t>
+            </a:r>
+            <a:endParaRPr lang="en-US" dirty="0"/>
+          </a:p>
+        </p:txBody>
+      </p:sp>
+    </p:spTree>
+    <p:extLst>
+      <p:ext uri="{BB962C8B-B14F-4D97-AF65-F5344CB8AC3E}">
+        <p14:creationId xmlns:p14="http://schemas.microsoft.com/office/powerpoint/2010/main" val="2843832134"/>
+      </p:ext>
+    </p:extLst>
+  </p:cSld>
+  <p:clrMapOvr>
+    <a:masterClrMapping/>
+  </p:clrMapOvr>
+  <p:timing>
+    <p:tnLst>
+      <p:par>
+        <p:cTn id="1" dur="indefinite" restart="never" nodeType="tmRoot"/>
+      </p:par>
+    </p:tnLst>
+  </p:timing>
+</p:sld>
+</file>
+
+<file path=ppt/slides/slide14.xml><?xml version="1.0" encoding="utf-8"?>
+<p:sld xmlns:a="http://schemas.openxmlformats.org/drawingml/2006/main" xmlns:r="http://schemas.openxmlformats.org/officeDocument/2006/relationships" xmlns:p="http://schemas.openxmlformats.org/presentationml/2006/main">
+  <p:cSld>
+    <p:spTree>
+      <p:nvGrpSpPr>
+        <p:cNvPr id="1" name=""/>
+        <p:cNvGrpSpPr/>
+        <p:nvPr/>
+      </p:nvGrpSpPr>
+      <p:grpSpPr>
+        <a:xfrm>
+          <a:off x="0" y="0"/>
+          <a:ext cx="0" cy="0"/>
+          <a:chOff x="0" y="0"/>
+          <a:chExt cx="0" cy="0"/>
+        </a:xfrm>
+      </p:grpSpPr>
+      <p:sp>
+        <p:nvSpPr>
+          <p:cNvPr id="2" name="Title 1"/>
+          <p:cNvSpPr>
+            <a:spLocks noGrp="1"/>
+          </p:cNvSpPr>
+          <p:nvPr>
+            <p:ph type="title"/>
+          </p:nvPr>
+        </p:nvSpPr>
+        <p:spPr/>
+        <p:txBody>
+          <a:bodyPr/>
+          <a:lstStyle/>
+          <a:p>
+            <a:r>
+              <a:rPr lang="en-US" dirty="0" smtClean="0"/>
+              <a:t>End of the Day’s Training</a:t>
+            </a:r>
+            <a:endParaRPr lang="en-US" dirty="0"/>
+          </a:p>
+        </p:txBody>
+      </p:sp>
+      <p:sp>
+        <p:nvSpPr>
+          <p:cNvPr id="3" name="Content Placeholder 2"/>
+          <p:cNvSpPr>
+            <a:spLocks noGrp="1"/>
+          </p:cNvSpPr>
+          <p:nvPr>
+            <p:ph idx="1"/>
+          </p:nvPr>
+        </p:nvSpPr>
+        <p:spPr/>
+        <p:txBody>
+          <a:bodyPr>
+            <a:normAutofit fontScale="92500" lnSpcReduction="10000"/>
+          </a:bodyPr>
+          <a:lstStyle/>
+          <a:p>
+            <a:r>
+              <a:rPr lang="en-US" dirty="0" smtClean="0"/>
+              <a:t>Recap the technology/concepts.</a:t>
+            </a:r>
+          </a:p>
+          <a:p>
+            <a:r>
+              <a:rPr lang="en-US" dirty="0" smtClean="0"/>
+              <a:t>You can use a quiz or a sample problem here.</a:t>
+            </a:r>
+          </a:p>
+          <a:p>
+            <a:r>
+              <a:rPr lang="en-US" dirty="0" smtClean="0"/>
+              <a:t>Again, swag counts!</a:t>
+            </a:r>
+          </a:p>
+          <a:p>
+            <a:r>
+              <a:rPr lang="en-US" dirty="0" smtClean="0"/>
+              <a:t>Take questions and suggestions.</a:t>
+            </a:r>
+          </a:p>
+          <a:p>
+            <a:r>
+              <a:rPr lang="en-US" dirty="0" smtClean="0"/>
+              <a:t>Look at your overall concept map.  Does it need changes?</a:t>
+            </a:r>
+          </a:p>
+          <a:p>
+            <a:r>
+              <a:rPr lang="en-US" dirty="0" smtClean="0"/>
+              <a:t>Remember, you don’t want to make drastic changes.  </a:t>
+            </a:r>
+          </a:p>
+          <a:p>
+            <a:r>
+              <a:rPr lang="en-US" dirty="0" smtClean="0"/>
+              <a:t>Try and stick as close to the plan as you can.</a:t>
+            </a:r>
+            <a:endParaRPr lang="en-US" dirty="0"/>
+          </a:p>
+        </p:txBody>
+      </p:sp>
+    </p:spTree>
+    <p:extLst>
+      <p:ext uri="{BB962C8B-B14F-4D97-AF65-F5344CB8AC3E}">
+        <p14:creationId xmlns:p14="http://schemas.microsoft.com/office/powerpoint/2010/main" val="3186237308"/>
+      </p:ext>
+    </p:extLst>
+  </p:cSld>
+  <p:clrMapOvr>
+    <a:masterClrMapping/>
+  </p:clrMapOvr>
+  <p:timing>
+    <p:tnLst>
+      <p:par>
+        <p:cTn id="1" dur="indefinite" restart="never" nodeType="tmRoot"/>
+      </p:par>
+    </p:tnLst>
+  </p:timing>
+</p:sld>
+</file>
+
+<file path=ppt/slides/slide15.xml><?xml version="1.0" encoding="utf-8"?>
+<p:sld xmlns:a="http://schemas.openxmlformats.org/drawingml/2006/main" xmlns:r="http://schemas.openxmlformats.org/officeDocument/2006/relationships" xmlns:p="http://schemas.openxmlformats.org/presentationml/2006/main">
+  <p:cSld>
+    <p:spTree>
+      <p:nvGrpSpPr>
+        <p:cNvPr id="1" name=""/>
+        <p:cNvGrpSpPr/>
+        <p:nvPr/>
+      </p:nvGrpSpPr>
+      <p:grpSpPr>
+        <a:xfrm>
+          <a:off x="0" y="0"/>
+          <a:ext cx="0" cy="0"/>
+          <a:chOff x="0" y="0"/>
+          <a:chExt cx="0" cy="0"/>
+        </a:xfrm>
+      </p:grpSpPr>
+      <p:sp>
+        <p:nvSpPr>
+          <p:cNvPr id="2" name="Title 1"/>
+          <p:cNvSpPr>
+            <a:spLocks noGrp="1"/>
+          </p:cNvSpPr>
+          <p:nvPr>
+            <p:ph type="title"/>
+          </p:nvPr>
+        </p:nvSpPr>
+        <p:spPr/>
+        <p:txBody>
+          <a:bodyPr/>
+          <a:lstStyle/>
+          <a:p>
+            <a:r>
+              <a:rPr lang="en-US" dirty="0" smtClean="0"/>
               <a:t>Prep for the Next Day</a:t>
             </a:r>
             <a:endParaRPr lang="en-US" dirty="0"/>
@@ -4307,7 +4567,7 @@
 </p:sld>
 </file>
 
-<file path=ppt/slides/slide14.xml><?xml version="1.0" encoding="utf-8"?>
+<file path=ppt/slides/slide16.xml><?xml version="1.0" encoding="utf-8"?>
 <p:sld xmlns:a="http://schemas.openxmlformats.org/drawingml/2006/main" xmlns:r="http://schemas.openxmlformats.org/officeDocument/2006/relationships" xmlns:p="http://schemas.openxmlformats.org/presentationml/2006/main">
   <p:cSld>
     <p:spTree>
@@ -4461,7 +4721,7 @@
 </p:sld>
 </file>
 
-<file path=ppt/slides/slide15.xml><?xml version="1.0" encoding="utf-8"?>
+<file path=ppt/slides/slide17.xml><?xml version="1.0" encoding="utf-8"?>
 <p:sld xmlns:a="http://schemas.openxmlformats.org/drawingml/2006/main" xmlns:r="http://schemas.openxmlformats.org/officeDocument/2006/relationships" xmlns:p="http://schemas.openxmlformats.org/presentationml/2006/main">
   <p:cSld>
     <p:spTree>
@@ -4599,7 +4859,7 @@
 </p:sld>
 </file>
 
-<file path=ppt/slides/slide16.xml><?xml version="1.0" encoding="utf-8"?>
+<file path=ppt/slides/slide18.xml><?xml version="1.0" encoding="utf-8"?>
 <p:sld xmlns:a="http://schemas.openxmlformats.org/drawingml/2006/main" xmlns:r="http://schemas.openxmlformats.org/officeDocument/2006/relationships" xmlns:p="http://schemas.openxmlformats.org/presentationml/2006/main">
   <p:cSld>
     <p:spTree>
@@ -4771,7 +5031,7 @@
 </p:sld>
 </file>
 
-<file path=ppt/slides/slide17.xml><?xml version="1.0" encoding="utf-8"?>
+<file path=ppt/slides/slide19.xml><?xml version="1.0" encoding="utf-8"?>
 <p:sld xmlns:a="http://schemas.openxmlformats.org/drawingml/2006/main" xmlns:r="http://schemas.openxmlformats.org/officeDocument/2006/relationships" xmlns:p="http://schemas.openxmlformats.org/presentationml/2006/main">
   <p:cSld>
     <p:spTree>
@@ -4958,6 +5218,202 @@
 </file>
 
 <file path=ppt/slides/slide3.xml><?xml version="1.0" encoding="utf-8"?>
+<p:sld xmlns:a="http://schemas.openxmlformats.org/drawingml/2006/main" xmlns:r="http://schemas.openxmlformats.org/officeDocument/2006/relationships" xmlns:p="http://schemas.openxmlformats.org/presentationml/2006/main">
+  <p:cSld>
+    <p:spTree>
+      <p:nvGrpSpPr>
+        <p:cNvPr id="1" name=""/>
+        <p:cNvGrpSpPr/>
+        <p:nvPr/>
+      </p:nvGrpSpPr>
+      <p:grpSpPr>
+        <a:xfrm>
+          <a:off x="0" y="0"/>
+          <a:ext cx="0" cy="0"/>
+          <a:chOff x="0" y="0"/>
+          <a:chExt cx="0" cy="0"/>
+        </a:xfrm>
+      </p:grpSpPr>
+      <p:sp>
+        <p:nvSpPr>
+          <p:cNvPr id="2" name="Title 1"/>
+          <p:cNvSpPr>
+            <a:spLocks noGrp="1"/>
+          </p:cNvSpPr>
+          <p:nvPr>
+            <p:ph type="title"/>
+          </p:nvPr>
+        </p:nvSpPr>
+        <p:spPr/>
+        <p:txBody>
+          <a:bodyPr/>
+          <a:lstStyle/>
+          <a:p>
+            <a:r>
+              <a:rPr lang="en-US" dirty="0" smtClean="0"/>
+              <a:t>Challenges of Training for XebiaLabs Tools</a:t>
+            </a:r>
+            <a:endParaRPr lang="en-US" dirty="0"/>
+          </a:p>
+        </p:txBody>
+      </p:sp>
+      <p:sp>
+        <p:nvSpPr>
+          <p:cNvPr id="3" name="Content Placeholder 2"/>
+          <p:cNvSpPr>
+            <a:spLocks noGrp="1"/>
+          </p:cNvSpPr>
+          <p:nvPr>
+            <p:ph idx="1"/>
+          </p:nvPr>
+        </p:nvSpPr>
+        <p:spPr/>
+        <p:txBody>
+          <a:bodyPr/>
+          <a:lstStyle/>
+          <a:p>
+            <a:endParaRPr lang="en-US" dirty="0" smtClean="0"/>
+          </a:p>
+          <a:p>
+            <a:r>
+              <a:rPr lang="en-US" dirty="0" smtClean="0"/>
+              <a:t>New model-based concept</a:t>
+            </a:r>
+            <a:endParaRPr lang="en-US" dirty="0"/>
+          </a:p>
+          <a:p>
+            <a:r>
+              <a:rPr lang="en-US" dirty="0" smtClean="0"/>
+              <a:t>Complex products</a:t>
+            </a:r>
+          </a:p>
+          <a:p>
+            <a:r>
+              <a:rPr lang="en-US" dirty="0" smtClean="0"/>
+              <a:t>Many interfaces to other complex products:  middleware, artifact repositories, security, etc.</a:t>
+            </a:r>
+          </a:p>
+          <a:p>
+            <a:r>
+              <a:rPr lang="en-US" dirty="0" smtClean="0"/>
+              <a:t>Wide range of user skill levels</a:t>
+            </a:r>
+          </a:p>
+          <a:p>
+            <a:endParaRPr lang="en-US" dirty="0"/>
+          </a:p>
+        </p:txBody>
+      </p:sp>
+    </p:spTree>
+    <p:extLst>
+      <p:ext uri="{BB962C8B-B14F-4D97-AF65-F5344CB8AC3E}">
+        <p14:creationId xmlns:p14="http://schemas.microsoft.com/office/powerpoint/2010/main" val="292434244"/>
+      </p:ext>
+    </p:extLst>
+  </p:cSld>
+  <p:clrMapOvr>
+    <a:masterClrMapping/>
+  </p:clrMapOvr>
+</p:sld>
+</file>
+
+<file path=ppt/slides/slide4.xml><?xml version="1.0" encoding="utf-8"?>
+<p:sld xmlns:a="http://schemas.openxmlformats.org/drawingml/2006/main" xmlns:r="http://schemas.openxmlformats.org/officeDocument/2006/relationships" xmlns:p="http://schemas.openxmlformats.org/presentationml/2006/main">
+  <p:cSld>
+    <p:spTree>
+      <p:nvGrpSpPr>
+        <p:cNvPr id="1" name=""/>
+        <p:cNvGrpSpPr/>
+        <p:nvPr/>
+      </p:nvGrpSpPr>
+      <p:grpSpPr>
+        <a:xfrm>
+          <a:off x="0" y="0"/>
+          <a:ext cx="0" cy="0"/>
+          <a:chOff x="0" y="0"/>
+          <a:chExt cx="0" cy="0"/>
+        </a:xfrm>
+      </p:grpSpPr>
+      <p:sp>
+        <p:nvSpPr>
+          <p:cNvPr id="2" name="Title 1"/>
+          <p:cNvSpPr>
+            <a:spLocks noGrp="1"/>
+          </p:cNvSpPr>
+          <p:nvPr>
+            <p:ph type="title"/>
+          </p:nvPr>
+        </p:nvSpPr>
+        <p:spPr/>
+        <p:txBody>
+          <a:bodyPr/>
+          <a:lstStyle/>
+          <a:p>
+            <a:r>
+              <a:rPr lang="en-US" dirty="0" smtClean="0"/>
+              <a:t>Needs of our Users</a:t>
+            </a:r>
+            <a:endParaRPr lang="en-US" dirty="0"/>
+          </a:p>
+        </p:txBody>
+      </p:sp>
+      <p:sp>
+        <p:nvSpPr>
+          <p:cNvPr id="3" name="Content Placeholder 2"/>
+          <p:cNvSpPr>
+            <a:spLocks noGrp="1"/>
+          </p:cNvSpPr>
+          <p:nvPr>
+            <p:ph idx="1"/>
+          </p:nvPr>
+        </p:nvSpPr>
+        <p:spPr/>
+        <p:txBody>
+          <a:bodyPr/>
+          <a:lstStyle/>
+          <a:p>
+            <a:r>
+              <a:rPr lang="en-US" dirty="0" smtClean="0"/>
+              <a:t>Basic:  running a deployment or a release</a:t>
+            </a:r>
+          </a:p>
+          <a:p>
+            <a:r>
+              <a:rPr lang="en-US" dirty="0" smtClean="0"/>
+              <a:t>Advanced:  scripts, plugins, interfacing with API</a:t>
+            </a:r>
+          </a:p>
+          <a:p>
+            <a:r>
+              <a:rPr lang="en-US" dirty="0" smtClean="0"/>
+              <a:t>Admin 1:  high-availability, databases, security</a:t>
+            </a:r>
+          </a:p>
+          <a:p>
+            <a:r>
+              <a:rPr lang="en-US" dirty="0" smtClean="0"/>
+              <a:t>Admin 2: structuring folders and permissions</a:t>
+            </a:r>
+          </a:p>
+          <a:p>
+            <a:endParaRPr lang="en-US" dirty="0"/>
+          </a:p>
+        </p:txBody>
+      </p:sp>
+    </p:spTree>
+    <p:extLst>
+      <p:ext uri="{BB962C8B-B14F-4D97-AF65-F5344CB8AC3E}">
+        <p14:creationId xmlns:p14="http://schemas.microsoft.com/office/powerpoint/2010/main" val="418017722"/>
+      </p:ext>
+    </p:extLst>
+  </p:cSld>
+  <p:clrMapOvr>
+    <a:masterClrMapping/>
+  </p:clrMapOvr>
+</p:sld>
+</file>
+
+<file path=ppt/slides/slide5.xml><?xml version="1.0" encoding="utf-8"?>
 <p:sld xmlns:a="http://schemas.openxmlformats.org/drawingml/2006/main" xmlns:r="http://schemas.openxmlformats.org/officeDocument/2006/relationships" xmlns:p="http://schemas.openxmlformats.org/presentationml/2006/main">
   <p:cSld>
     <p:spTree>
@@ -5141,7 +5597,7 @@
 </p:sld>
 </file>
 
-<file path=ppt/slides/slide4.xml><?xml version="1.0" encoding="utf-8"?>
+<file path=ppt/slides/slide6.xml><?xml version="1.0" encoding="utf-8"?>
 <p:sld xmlns:a="http://schemas.openxmlformats.org/drawingml/2006/main" xmlns:r="http://schemas.openxmlformats.org/officeDocument/2006/relationships" xmlns:p="http://schemas.openxmlformats.org/presentationml/2006/main">
   <p:cSld>
     <p:spTree>
@@ -5273,7 +5729,7 @@
 </p:sld>
 </file>
 
-<file path=ppt/slides/slide5.xml><?xml version="1.0" encoding="utf-8"?>
+<file path=ppt/slides/slide7.xml><?xml version="1.0" encoding="utf-8"?>
 <p:sld xmlns:a="http://schemas.openxmlformats.org/drawingml/2006/main" xmlns:r="http://schemas.openxmlformats.org/officeDocument/2006/relationships" xmlns:p="http://schemas.openxmlformats.org/presentationml/2006/main">
   <p:cSld>
     <p:spTree>
@@ -5398,7 +5854,7 @@
 </p:sld>
 </file>
 
-<file path=ppt/slides/slide6.xml><?xml version="1.0" encoding="utf-8"?>
+<file path=ppt/slides/slide8.xml><?xml version="1.0" encoding="utf-8"?>
 <p:sld xmlns:a="http://schemas.openxmlformats.org/drawingml/2006/main" xmlns:r="http://schemas.openxmlformats.org/officeDocument/2006/relationships" xmlns:p="http://schemas.openxmlformats.org/presentationml/2006/main">
   <p:cSld>
     <p:spTree>
@@ -5626,332 +6082,6 @@
 </p:sld>
 </file>
 
-<file path=ppt/slides/slide7.xml><?xml version="1.0" encoding="utf-8"?>
-<p:sld xmlns:a="http://schemas.openxmlformats.org/drawingml/2006/main" xmlns:r="http://schemas.openxmlformats.org/officeDocument/2006/relationships" xmlns:p="http://schemas.openxmlformats.org/presentationml/2006/main">
-  <p:cSld>
-    <p:spTree>
-      <p:nvGrpSpPr>
-        <p:cNvPr id="1" name=""/>
-        <p:cNvGrpSpPr/>
-        <p:nvPr/>
-      </p:nvGrpSpPr>
-      <p:grpSpPr>
-        <a:xfrm>
-          <a:off x="0" y="0"/>
-          <a:ext cx="0" cy="0"/>
-          <a:chOff x="0" y="0"/>
-          <a:chExt cx="0" cy="0"/>
-        </a:xfrm>
-      </p:grpSpPr>
-      <p:sp>
-        <p:nvSpPr>
-          <p:cNvPr id="2" name="Title 1"/>
-          <p:cNvSpPr>
-            <a:spLocks noGrp="1"/>
-          </p:cNvSpPr>
-          <p:nvPr>
-            <p:ph type="title"/>
-          </p:nvPr>
-        </p:nvSpPr>
-        <p:spPr>
-          <a:xfrm>
-            <a:off x="779462" y="653871"/>
-            <a:ext cx="7581901" cy="1200514"/>
-          </a:xfrm>
-        </p:spPr>
-        <p:txBody>
-          <a:bodyPr/>
-          <a:lstStyle/>
-          <a:p>
-            <a:r>
-              <a:rPr lang="en-US" dirty="0" smtClean="0"/>
-              <a:t>Active Learning- Hands On</a:t>
-            </a:r>
-            <a:br>
-              <a:rPr lang="en-US" dirty="0" smtClean="0"/>
-            </a:br>
-            <a:endParaRPr lang="en-US" dirty="0"/>
-          </a:p>
-        </p:txBody>
-      </p:sp>
-      <p:sp>
-        <p:nvSpPr>
-          <p:cNvPr id="3" name="Content Placeholder 2"/>
-          <p:cNvSpPr>
-            <a:spLocks noGrp="1"/>
-          </p:cNvSpPr>
-          <p:nvPr>
-            <p:ph sz="half" idx="1"/>
-          </p:nvPr>
-        </p:nvSpPr>
-        <p:spPr>
-          <a:xfrm>
-            <a:off x="779462" y="1693468"/>
-            <a:ext cx="3657600" cy="4830724"/>
-          </a:xfrm>
-        </p:spPr>
-        <p:txBody>
-          <a:bodyPr>
-            <a:normAutofit fontScale="55000" lnSpcReduction="20000"/>
-          </a:bodyPr>
-          <a:lstStyle/>
-          <a:p>
-            <a:r>
-              <a:rPr lang="en-US" sz="2200" dirty="0" smtClean="0"/>
-              <a:t>Current andragogy= Hands on teaching</a:t>
-            </a:r>
-          </a:p>
-          <a:p>
-            <a:r>
-              <a:rPr lang="en-US" sz="2200" dirty="0" smtClean="0"/>
-              <a:t>Divide up the day into 4-5 sections.  Make sure trainees have materials they need to complete each section</a:t>
-            </a:r>
-          </a:p>
-          <a:p>
-            <a:r>
-              <a:rPr lang="en-US" sz="2200" dirty="0" smtClean="0"/>
-              <a:t>Within these sections, break up activities into 20-30 minute chunks of time with frequent breaks.</a:t>
-            </a:r>
-          </a:p>
-          <a:p>
-            <a:r>
-              <a:rPr lang="en-US" sz="2200" dirty="0" smtClean="0"/>
-              <a:t>Explain the technology briefly</a:t>
-            </a:r>
-          </a:p>
-          <a:p>
-            <a:r>
-              <a:rPr lang="en-US" sz="2200" dirty="0" smtClean="0"/>
-              <a:t>Demonstrate the concept first.  Then have others attempt it.</a:t>
-            </a:r>
-          </a:p>
-          <a:p>
-            <a:r>
-              <a:rPr lang="en-US" sz="2200" dirty="0" smtClean="0"/>
-              <a:t>After hands on, don</a:t>
-            </a:r>
-            <a:r>
-              <a:rPr lang="mr-IN" sz="2200" dirty="0" smtClean="0"/>
-              <a:t>’</a:t>
-            </a:r>
-            <a:r>
-              <a:rPr lang="en-US" sz="2200" dirty="0" smtClean="0"/>
-              <a:t>t just keep explaining.  Ask trainees to come up with ways that they can utilize the technology and then build on that.</a:t>
-            </a:r>
-          </a:p>
-          <a:p>
-            <a:r>
-              <a:rPr lang="en-US" sz="2200" dirty="0" smtClean="0"/>
-              <a:t>People love stories.  It is often the best way to learn and helps retain information. </a:t>
-            </a:r>
-          </a:p>
-          <a:p>
-            <a:r>
-              <a:rPr lang="en-US" sz="2200" dirty="0" smtClean="0"/>
-              <a:t>Have stories ready of the companies who utilized the technology, the challenges and the successes.  This will help them see the applications</a:t>
-            </a:r>
-            <a:r>
-              <a:rPr lang="en-US" dirty="0" smtClean="0"/>
-              <a:t>.</a:t>
-            </a:r>
-          </a:p>
-        </p:txBody>
-      </p:sp>
-      <p:pic>
-        <p:nvPicPr>
-          <p:cNvPr id="5" name="Content Placeholder 4"/>
-          <p:cNvPicPr>
-            <a:picLocks noGrp="1" noChangeAspect="1"/>
-          </p:cNvPicPr>
-          <p:nvPr>
-            <p:ph sz="half" idx="2"/>
-          </p:nvPr>
-        </p:nvPicPr>
-        <p:blipFill>
-          <a:blip r:embed="rId2"/>
-          <a:srcRect l="28192" r="28192"/>
-          <a:stretch>
-            <a:fillRect/>
-          </a:stretch>
-        </p:blipFill>
-        <p:spPr/>
-      </p:pic>
-    </p:spTree>
-    <p:extLst>
-      <p:ext uri="{BB962C8B-B14F-4D97-AF65-F5344CB8AC3E}">
-        <p14:creationId xmlns:p14="http://schemas.microsoft.com/office/powerpoint/2010/main" val="1817399839"/>
-      </p:ext>
-    </p:extLst>
-  </p:cSld>
-  <p:clrMapOvr>
-    <a:masterClrMapping/>
-  </p:clrMapOvr>
-  <p:timing>
-    <p:tnLst>
-      <p:par>
-        <p:cTn id="1" dur="indefinite" restart="never" nodeType="tmRoot"/>
-      </p:par>
-    </p:tnLst>
-  </p:timing>
-</p:sld>
-</file>
-
-<file path=ppt/slides/slide8.xml><?xml version="1.0" encoding="utf-8"?>
-<p:sld xmlns:a="http://schemas.openxmlformats.org/drawingml/2006/main" xmlns:r="http://schemas.openxmlformats.org/officeDocument/2006/relationships" xmlns:p="http://schemas.openxmlformats.org/presentationml/2006/main">
-  <p:cSld>
-    <p:spTree>
-      <p:nvGrpSpPr>
-        <p:cNvPr id="1" name=""/>
-        <p:cNvGrpSpPr/>
-        <p:nvPr/>
-      </p:nvGrpSpPr>
-      <p:grpSpPr>
-        <a:xfrm>
-          <a:off x="0" y="0"/>
-          <a:ext cx="0" cy="0"/>
-          <a:chOff x="0" y="0"/>
-          <a:chExt cx="0" cy="0"/>
-        </a:xfrm>
-      </p:grpSpPr>
-      <p:sp>
-        <p:nvSpPr>
-          <p:cNvPr id="2" name="Title 1"/>
-          <p:cNvSpPr>
-            <a:spLocks noGrp="1"/>
-          </p:cNvSpPr>
-          <p:nvPr>
-            <p:ph type="title"/>
-          </p:nvPr>
-        </p:nvSpPr>
-        <p:spPr/>
-        <p:txBody>
-          <a:bodyPr/>
-          <a:lstStyle/>
-          <a:p>
-            <a:r>
-              <a:rPr lang="en-US" dirty="0" smtClean="0"/>
-              <a:t>Quizzing</a:t>
-            </a:r>
-            <a:endParaRPr lang="en-US" dirty="0"/>
-          </a:p>
-        </p:txBody>
-      </p:sp>
-      <p:sp>
-        <p:nvSpPr>
-          <p:cNvPr id="3" name="Content Placeholder 2"/>
-          <p:cNvSpPr>
-            <a:spLocks noGrp="1"/>
-          </p:cNvSpPr>
-          <p:nvPr>
-            <p:ph sz="half" idx="1"/>
-          </p:nvPr>
-        </p:nvSpPr>
-        <p:spPr/>
-        <p:txBody>
-          <a:bodyPr>
-            <a:normAutofit fontScale="55000" lnSpcReduction="20000"/>
-          </a:bodyPr>
-          <a:lstStyle/>
-          <a:p>
-            <a:r>
-              <a:rPr lang="en-US" dirty="0" smtClean="0"/>
-              <a:t>You may or may not want to do this, but it is an effective way to learn and retain, especially if there are a few people at your training.</a:t>
-            </a:r>
-          </a:p>
-          <a:p>
-            <a:r>
-              <a:rPr lang="en-US" dirty="0" smtClean="0">
-                <a:solidFill>
-                  <a:srgbClr val="FFFF00"/>
-                </a:solidFill>
-              </a:rPr>
-              <a:t>Studies have shown that quizzing is a good retention/application technique</a:t>
-            </a:r>
-            <a:r>
-              <a:rPr lang="en-US" dirty="0" smtClean="0"/>
-              <a:t>.</a:t>
-            </a:r>
-          </a:p>
-          <a:p>
-            <a:r>
-              <a:rPr lang="en-US" dirty="0" smtClean="0"/>
-              <a:t>After each section (or every two sections), have a quiz or some kind of sample problem around the technology covered.  Make it a contest!</a:t>
-            </a:r>
-          </a:p>
-          <a:p>
-            <a:r>
-              <a:rPr lang="en-US" dirty="0" smtClean="0"/>
-              <a:t>Everyone loves swag, candy, any kind of motivator.</a:t>
-            </a:r>
-          </a:p>
-          <a:p>
-            <a:r>
-              <a:rPr lang="en-US" dirty="0" smtClean="0"/>
-              <a:t>This will break up the day.</a:t>
-            </a:r>
-          </a:p>
-          <a:p>
-            <a:r>
-              <a:rPr lang="en-US" dirty="0" smtClean="0"/>
-              <a:t>This also makes it seem like a class, which formalizes the training. </a:t>
-            </a:r>
-          </a:p>
-          <a:p>
-            <a:r>
-              <a:rPr lang="en-US" dirty="0" smtClean="0">
-                <a:solidFill>
-                  <a:srgbClr val="FFFF00"/>
-                </a:solidFill>
-              </a:rPr>
-              <a:t>Most importantly, it helps with identifying training gaps! </a:t>
-            </a:r>
-            <a:endParaRPr lang="en-US" dirty="0">
-              <a:solidFill>
-                <a:srgbClr val="FFFF00"/>
-              </a:solidFill>
-            </a:endParaRPr>
-          </a:p>
-        </p:txBody>
-      </p:sp>
-      <p:pic>
-        <p:nvPicPr>
-          <p:cNvPr id="5" name="Content Placeholder 4"/>
-          <p:cNvPicPr>
-            <a:picLocks noGrp="1" noChangeAspect="1"/>
-          </p:cNvPicPr>
-          <p:nvPr>
-            <p:ph sz="half" idx="2"/>
-          </p:nvPr>
-        </p:nvPicPr>
-        <p:blipFill>
-          <a:blip r:embed="rId2"/>
-          <a:srcRect l="1814" r="1814"/>
-          <a:stretch>
-            <a:fillRect/>
-          </a:stretch>
-        </p:blipFill>
-        <p:spPr/>
-      </p:pic>
-    </p:spTree>
-    <p:extLst>
-      <p:ext uri="{BB962C8B-B14F-4D97-AF65-F5344CB8AC3E}">
-        <p14:creationId xmlns:p14="http://schemas.microsoft.com/office/powerpoint/2010/main" val="1802896055"/>
-      </p:ext>
-    </p:extLst>
-  </p:cSld>
-  <p:clrMapOvr>
-    <a:masterClrMapping/>
-  </p:clrMapOvr>
-  <p:timing>
-    <p:tnLst>
-      <p:par>
-        <p:cTn id="1" dur="indefinite" restart="never" nodeType="tmRoot"/>
-      </p:par>
-    </p:tnLst>
-  </p:timing>
-</p:sld>
-</file>
-
 <file path=ppt/slides/slide9.xml><?xml version="1.0" encoding="utf-8"?>
 <p:sld xmlns:a="http://schemas.openxmlformats.org/drawingml/2006/main" xmlns:r="http://schemas.openxmlformats.org/officeDocument/2006/relationships" xmlns:p="http://schemas.openxmlformats.org/presentationml/2006/main">
   <p:cSld>
@@ -5979,15 +6109,23 @@
             <p:ph type="title"/>
           </p:nvPr>
         </p:nvSpPr>
-        <p:spPr/>
-        <p:txBody>
-          <a:bodyPr/>
-          <a:lstStyle/>
-          <a:p>
-            <a:r>
-              <a:rPr lang="en-US" dirty="0" smtClean="0"/>
-              <a:t>Quizzes and Sample Problems</a:t>
-            </a:r>
+        <p:spPr>
+          <a:xfrm>
+            <a:off x="779462" y="653871"/>
+            <a:ext cx="7581901" cy="1200514"/>
+          </a:xfrm>
+        </p:spPr>
+        <p:txBody>
+          <a:bodyPr/>
+          <a:lstStyle/>
+          <a:p>
+            <a:r>
+              <a:rPr lang="en-US" dirty="0" smtClean="0"/>
+              <a:t>Active Learning- Hands On</a:t>
+            </a:r>
+            <a:br>
+              <a:rPr lang="en-US" dirty="0" smtClean="0"/>
+            </a:br>
             <a:endParaRPr lang="en-US" dirty="0"/>
           </a:p>
         </p:txBody>
@@ -5999,45 +6137,105 @@
             <a:spLocks noGrp="1"/>
           </p:cNvSpPr>
           <p:nvPr>
-            <p:ph idx="1"/>
-          </p:nvPr>
-        </p:nvSpPr>
-        <p:spPr/>
-        <p:txBody>
-          <a:bodyPr/>
-          <a:lstStyle/>
-          <a:p>
-            <a:r>
-              <a:rPr lang="en-US" dirty="0" smtClean="0"/>
-              <a:t>Make sure you have a few quizzes and sample problems ready to go</a:t>
-            </a:r>
-          </a:p>
-          <a:p>
-            <a:r>
-              <a:rPr lang="en-US" dirty="0" smtClean="0"/>
-              <a:t>Companies are buying your technology to help them solve their problems.  </a:t>
-            </a:r>
-            <a:endParaRPr lang="en-US" dirty="0"/>
-          </a:p>
-          <a:p>
-            <a:r>
-              <a:rPr lang="en-US" dirty="0" smtClean="0"/>
-              <a:t>Mock up some common issues and have trainees solve it with the technology.</a:t>
-            </a:r>
-          </a:p>
-          <a:p>
-            <a:r>
-              <a:rPr lang="en-US" dirty="0" smtClean="0"/>
-              <a:t>This will help ingrain the application and help them see the utilization</a:t>
-            </a:r>
-            <a:endParaRPr lang="en-US" dirty="0"/>
-          </a:p>
-        </p:txBody>
-      </p:sp>
+            <p:ph sz="half" idx="1"/>
+          </p:nvPr>
+        </p:nvSpPr>
+        <p:spPr>
+          <a:xfrm>
+            <a:off x="779462" y="1693468"/>
+            <a:ext cx="3657600" cy="4830724"/>
+          </a:xfrm>
+        </p:spPr>
+        <p:txBody>
+          <a:bodyPr>
+            <a:normAutofit fontScale="55000" lnSpcReduction="20000"/>
+          </a:bodyPr>
+          <a:lstStyle/>
+          <a:p>
+            <a:r>
+              <a:rPr lang="en-US" sz="2200" dirty="0" smtClean="0"/>
+              <a:t>Current andragogy= Hands on teaching</a:t>
+            </a:r>
+          </a:p>
+          <a:p>
+            <a:r>
+              <a:rPr lang="en-US" sz="2200" dirty="0" smtClean="0"/>
+              <a:t>Divide up the day into 4-5 sections.  Make sure trainees have materials they need to complete each section</a:t>
+            </a:r>
+          </a:p>
+          <a:p>
+            <a:r>
+              <a:rPr lang="en-US" sz="2200" dirty="0" smtClean="0"/>
+              <a:t>Within these sections, break up activities into 20-30 minute chunks of time with frequent breaks.</a:t>
+            </a:r>
+          </a:p>
+          <a:p>
+            <a:r>
+              <a:rPr lang="en-US" sz="2200" dirty="0" smtClean="0"/>
+              <a:t>Explain the technology briefly</a:t>
+            </a:r>
+          </a:p>
+          <a:p>
+            <a:r>
+              <a:rPr lang="en-US" sz="2200" dirty="0" smtClean="0"/>
+              <a:t>Demonstrate the concept first.  Then have others attempt it.</a:t>
+            </a:r>
+          </a:p>
+          <a:p>
+            <a:r>
+              <a:rPr lang="en-US" sz="2200" dirty="0" smtClean="0"/>
+              <a:t>After hands on, don</a:t>
+            </a:r>
+            <a:r>
+              <a:rPr lang="mr-IN" sz="2200" dirty="0" smtClean="0"/>
+              <a:t>’</a:t>
+            </a:r>
+            <a:r>
+              <a:rPr lang="en-US" sz="2200" dirty="0" smtClean="0"/>
+              <a:t>t just keep explaining.  Ask trainees to come up with ways that they can utilize the technology and then build on that.</a:t>
+            </a:r>
+          </a:p>
+          <a:p>
+            <a:r>
+              <a:rPr lang="en-US" sz="2200" dirty="0" smtClean="0"/>
+              <a:t>People love stories.  It is often the best way to learn and helps retain information. </a:t>
+            </a:r>
+          </a:p>
+          <a:p>
+            <a:r>
+              <a:rPr lang="en-US" sz="2200" dirty="0" smtClean="0"/>
+              <a:t>Have stories ready of the companies who utilized the technology, the challenges and the successes.  This will help them see the applications</a:t>
+            </a:r>
+            <a:r>
+              <a:rPr lang="en-US" dirty="0" smtClean="0"/>
+              <a:t>.</a:t>
+            </a:r>
+          </a:p>
+        </p:txBody>
+      </p:sp>
+      <p:pic>
+        <p:nvPicPr>
+          <p:cNvPr id="5" name="Content Placeholder 4"/>
+          <p:cNvPicPr>
+            <a:picLocks noGrp="1" noChangeAspect="1"/>
+          </p:cNvPicPr>
+          <p:nvPr>
+            <p:ph sz="half" idx="2"/>
+          </p:nvPr>
+        </p:nvPicPr>
+        <p:blipFill>
+          <a:blip r:embed="rId2"/>
+          <a:srcRect l="28192" r="28192"/>
+          <a:stretch>
+            <a:fillRect/>
+          </a:stretch>
+        </p:blipFill>
+        <p:spPr/>
+      </p:pic>
     </p:spTree>
     <p:extLst>
       <p:ext uri="{BB962C8B-B14F-4D97-AF65-F5344CB8AC3E}">
-        <p14:creationId xmlns:p14="http://schemas.microsoft.com/office/powerpoint/2010/main" val="3428838318"/>
+        <p14:creationId xmlns:p14="http://schemas.microsoft.com/office/powerpoint/2010/main" val="1817399839"/>
       </p:ext>
     </p:extLst>
   </p:cSld>

</xml_diff>